<commit_message>
Second commit- 'changes to presentation
</commit_message>
<xml_diff>
--- a/Customer Churn rate Prediction Model for SyriaTel Company.pptx
+++ b/Customer Churn rate Prediction Model for SyriaTel Company.pptx
@@ -9,7 +9,9 @@
     <p:sldId id="257" r:id="rId3"/>
     <p:sldId id="259" r:id="rId4"/>
     <p:sldId id="260" r:id="rId5"/>
-    <p:sldId id="258" r:id="rId6"/>
+    <p:sldId id="261" r:id="rId6"/>
+    <p:sldId id="262" r:id="rId7"/>
+    <p:sldId id="263" r:id="rId8"/>
   </p:sldIdLst>
   <p:sldSz cx="12192000" cy="6858000"/>
   <p:notesSz cx="6858000" cy="9144000"/>
@@ -108,11 +110,116 @@
       </a:defRPr>
     </a:lvl9pPr>
   </p:defaultTextStyle>
+  <p:extLst>
+    <p:ext uri="{EFAFB233-063F-42B5-8137-9DF3F51BA10A}">
+      <p15:sldGuideLst xmlns:p15="http://schemas.microsoft.com/office/powerpoint/2012/main"/>
+    </p:ext>
+  </p:extLst>
 </p:presentation>
 </file>
 
 <file path=ppt/changesInfos/changesInfo1.xml><?xml version="1.0" encoding="utf-8"?>
 <pc:chgInfo xmlns:a="http://schemas.openxmlformats.org/drawingml/2006/main" xmlns:r="http://schemas.openxmlformats.org/officeDocument/2006/relationships" xmlns:ac="http://schemas.microsoft.com/office/drawing/2013/main/command" xmlns:pc="http://schemas.microsoft.com/office/powerpoint/2013/main/command">
+  <pc:docChgLst>
+    <pc:chgData name="DANIEL KITHINJI" userId="b79b49471f314f51" providerId="LiveId" clId="{D13FFEC6-0668-43AA-8E2D-B7ECDAB2680A}"/>
+    <pc:docChg chg="custSel addSld delSld modSld">
+      <pc:chgData name="DANIEL KITHINJI" userId="b79b49471f314f51" providerId="LiveId" clId="{D13FFEC6-0668-43AA-8E2D-B7ECDAB2680A}" dt="2024-12-23T06:53:31.600" v="686" actId="20577"/>
+      <pc:docMkLst>
+        <pc:docMk/>
+      </pc:docMkLst>
+      <pc:sldChg chg="del">
+        <pc:chgData name="DANIEL KITHINJI" userId="b79b49471f314f51" providerId="LiveId" clId="{D13FFEC6-0668-43AA-8E2D-B7ECDAB2680A}" dt="2024-12-23T06:42:14.214" v="130" actId="47"/>
+        <pc:sldMkLst>
+          <pc:docMk/>
+          <pc:sldMk cId="2167070895" sldId="258"/>
+        </pc:sldMkLst>
+      </pc:sldChg>
+      <pc:sldChg chg="modSp mod">
+        <pc:chgData name="DANIEL KITHINJI" userId="b79b49471f314f51" providerId="LiveId" clId="{D13FFEC6-0668-43AA-8E2D-B7ECDAB2680A}" dt="2024-12-23T06:45:48.579" v="161" actId="20577"/>
+        <pc:sldMkLst>
+          <pc:docMk/>
+          <pc:sldMk cId="2705192981" sldId="260"/>
+        </pc:sldMkLst>
+        <pc:spChg chg="mod">
+          <ac:chgData name="DANIEL KITHINJI" userId="b79b49471f314f51" providerId="LiveId" clId="{D13FFEC6-0668-43AA-8E2D-B7ECDAB2680A}" dt="2024-12-23T06:45:48.579" v="161" actId="20577"/>
+          <ac:spMkLst>
+            <pc:docMk/>
+            <pc:sldMk cId="2705192981" sldId="260"/>
+            <ac:spMk id="5" creationId="{F484E38F-302F-7C86-363B-0BD091D4308F}"/>
+          </ac:spMkLst>
+        </pc:spChg>
+      </pc:sldChg>
+      <pc:sldChg chg="modSp add mod">
+        <pc:chgData name="DANIEL KITHINJI" userId="b79b49471f314f51" providerId="LiveId" clId="{D13FFEC6-0668-43AA-8E2D-B7ECDAB2680A}" dt="2024-12-23T06:45:35.803" v="159" actId="20577"/>
+        <pc:sldMkLst>
+          <pc:docMk/>
+          <pc:sldMk cId="679891736" sldId="261"/>
+        </pc:sldMkLst>
+        <pc:spChg chg="mod">
+          <ac:chgData name="DANIEL KITHINJI" userId="b79b49471f314f51" providerId="LiveId" clId="{D13FFEC6-0668-43AA-8E2D-B7ECDAB2680A}" dt="2024-12-23T06:43:22.776" v="149" actId="20577"/>
+          <ac:spMkLst>
+            <pc:docMk/>
+            <pc:sldMk cId="679891736" sldId="261"/>
+            <ac:spMk id="4" creationId="{F4874019-7F76-6229-924D-A4C654B022F0}"/>
+          </ac:spMkLst>
+        </pc:spChg>
+        <pc:spChg chg="mod">
+          <ac:chgData name="DANIEL KITHINJI" userId="b79b49471f314f51" providerId="LiveId" clId="{D13FFEC6-0668-43AA-8E2D-B7ECDAB2680A}" dt="2024-12-23T06:45:35.803" v="159" actId="20577"/>
+          <ac:spMkLst>
+            <pc:docMk/>
+            <pc:sldMk cId="679891736" sldId="261"/>
+            <ac:spMk id="5" creationId="{E8473AE4-C804-F39B-D6E1-3A3965229F2E}"/>
+          </ac:spMkLst>
+        </pc:spChg>
+      </pc:sldChg>
+      <pc:sldChg chg="modSp add mod">
+        <pc:chgData name="DANIEL KITHINJI" userId="b79b49471f314f51" providerId="LiveId" clId="{D13FFEC6-0668-43AA-8E2D-B7ECDAB2680A}" dt="2024-12-23T06:52:56.546" v="668" actId="20577"/>
+        <pc:sldMkLst>
+          <pc:docMk/>
+          <pc:sldMk cId="955604182" sldId="262"/>
+        </pc:sldMkLst>
+        <pc:spChg chg="mod">
+          <ac:chgData name="DANIEL KITHINJI" userId="b79b49471f314f51" providerId="LiveId" clId="{D13FFEC6-0668-43AA-8E2D-B7ECDAB2680A}" dt="2024-12-23T06:46:18.774" v="177" actId="20577"/>
+          <ac:spMkLst>
+            <pc:docMk/>
+            <pc:sldMk cId="955604182" sldId="262"/>
+            <ac:spMk id="4" creationId="{C7E5518E-0BBE-71C3-2268-032A9157CCDB}"/>
+          </ac:spMkLst>
+        </pc:spChg>
+        <pc:spChg chg="mod">
+          <ac:chgData name="DANIEL KITHINJI" userId="b79b49471f314f51" providerId="LiveId" clId="{D13FFEC6-0668-43AA-8E2D-B7ECDAB2680A}" dt="2024-12-23T06:52:56.546" v="668" actId="20577"/>
+          <ac:spMkLst>
+            <pc:docMk/>
+            <pc:sldMk cId="955604182" sldId="262"/>
+            <ac:spMk id="5" creationId="{53E527FA-664B-787A-197A-211D120CAAD8}"/>
+          </ac:spMkLst>
+        </pc:spChg>
+      </pc:sldChg>
+      <pc:sldChg chg="modSp add mod">
+        <pc:chgData name="DANIEL KITHINJI" userId="b79b49471f314f51" providerId="LiveId" clId="{D13FFEC6-0668-43AA-8E2D-B7ECDAB2680A}" dt="2024-12-23T06:53:31.600" v="686" actId="20577"/>
+        <pc:sldMkLst>
+          <pc:docMk/>
+          <pc:sldMk cId="1818200951" sldId="263"/>
+        </pc:sldMkLst>
+        <pc:spChg chg="mod">
+          <ac:chgData name="DANIEL KITHINJI" userId="b79b49471f314f51" providerId="LiveId" clId="{D13FFEC6-0668-43AA-8E2D-B7ECDAB2680A}" dt="2024-12-23T06:53:18.625" v="685" actId="20577"/>
+          <ac:spMkLst>
+            <pc:docMk/>
+            <pc:sldMk cId="1818200951" sldId="263"/>
+            <ac:spMk id="4" creationId="{86D22DE6-E225-2EC6-A5BE-076E9E245864}"/>
+          </ac:spMkLst>
+        </pc:spChg>
+        <pc:spChg chg="mod">
+          <ac:chgData name="DANIEL KITHINJI" userId="b79b49471f314f51" providerId="LiveId" clId="{D13FFEC6-0668-43AA-8E2D-B7ECDAB2680A}" dt="2024-12-23T06:53:31.600" v="686" actId="20577"/>
+          <ac:spMkLst>
+            <pc:docMk/>
+            <pc:sldMk cId="1818200951" sldId="263"/>
+            <ac:spMk id="5" creationId="{05E1F9A5-F49E-F8DA-9954-30A2BF7D4041}"/>
+          </ac:spMkLst>
+        </pc:spChg>
+      </pc:sldChg>
+    </pc:docChg>
+  </pc:docChgLst>
   <pc:docChgLst>
     <pc:chgData name="DANIEL KITHINJI" userId="b79b49471f314f51" providerId="LiveId" clId="{48576400-4856-43A8-8DC9-816C0A333ED4}"/>
     <pc:docChg chg="undo redo custSel addSld modSld">
@@ -4745,230 +4852,91 @@
           <a:lstStyle/>
           <a:p>
             <a:r>
-              <a:rPr lang="en-US" sz="1200" dirty="0"/>
-              <a:t>Dataset Insights:</a:t>
-            </a:r>
-          </a:p>
-          <a:p>
-            <a:r>
-              <a:rPr lang="en-US" sz="1200" dirty="0"/>
-              <a:t>No Missing Values: All columns have complete data.</a:t>
-            </a:r>
-          </a:p>
-          <a:p>
-            <a:r>
-              <a:rPr lang="en-US" sz="1200" dirty="0"/>
+              <a:rPr lang="en-US" dirty="0"/>
               <a:t>The </a:t>
             </a:r>
             <a:r>
-              <a:rPr lang="en-US" sz="1200" dirty="0" err="1"/>
+              <a:rPr lang="en-US" dirty="0" err="1"/>
               <a:t>SyriaTel</a:t>
             </a:r>
             <a:r>
-              <a:rPr lang="en-US" sz="1200" dirty="0"/>
+              <a:rPr lang="en-US" dirty="0"/>
               <a:t> dataset contains 3333 rows and 21 columns comprising of; 16 Numerical columns and 4 Categorical columns and 1 Boolean column. The dataset has four data types (integer, float, object and </a:t>
             </a:r>
             <a:r>
-              <a:rPr lang="en-US" sz="1200" dirty="0" err="1"/>
+              <a:rPr lang="en-US" dirty="0" err="1"/>
               <a:t>boolean</a:t>
             </a:r>
             <a:r>
-              <a:rPr lang="en-US" sz="1200" dirty="0"/>
+              <a:rPr lang="en-US" dirty="0"/>
               <a:t>)</a:t>
             </a:r>
           </a:p>
           <a:p>
-            <a:endParaRPr lang="en-US" sz="1200" dirty="0"/>
-          </a:p>
-          <a:p>
-            <a:r>
-              <a:rPr lang="en-US" sz="1200" dirty="0"/>
-              <a:t>The Categorical columns includes</a:t>
-            </a:r>
-            <a:r>
-              <a:rPr lang="en-US" sz="1200"/>
-              <a:t>:   State, Phone </a:t>
-            </a:r>
-            <a:r>
-              <a:rPr lang="en-US" sz="1200" dirty="0"/>
-              <a:t>number</a:t>
-            </a:r>
-          </a:p>
-          <a:p>
-            <a:r>
-              <a:rPr lang="en-US" sz="1200" dirty="0"/>
-              <a:t>- International plan</a:t>
-            </a:r>
-          </a:p>
-          <a:p>
-            <a:r>
-              <a:rPr lang="en-US" sz="1200" dirty="0"/>
-              <a:t>- voice mail plan</a:t>
-            </a:r>
-          </a:p>
-          <a:p>
-            <a:endParaRPr lang="en-US" sz="1200" dirty="0"/>
-          </a:p>
-          <a:p>
-            <a:r>
-              <a:rPr lang="en-US" sz="1200" dirty="0"/>
-              <a:t>The Numerical columns includes:</a:t>
-            </a:r>
-          </a:p>
-          <a:p>
-            <a:r>
-              <a:rPr lang="en-US" sz="1200" dirty="0"/>
-              <a:t>- account length,</a:t>
-            </a:r>
-          </a:p>
-          <a:p>
-            <a:r>
-              <a:rPr lang="en-US" sz="1200" dirty="0"/>
-              <a:t>- area code,</a:t>
-            </a:r>
-          </a:p>
-          <a:p>
-            <a:r>
-              <a:rPr lang="en-US" sz="1200" dirty="0"/>
-              <a:t>- number </a:t>
-            </a:r>
-            <a:r>
-              <a:rPr lang="en-US" sz="1200" dirty="0" err="1"/>
+            <a:r>
+              <a:rPr lang="en-US" b="1" dirty="0"/>
+              <a:t>The Categorical columns includes ;</a:t>
+            </a:r>
+            <a:r>
+              <a:rPr lang="en-US" dirty="0"/>
+              <a:t>  State, Phone number, International plan, &amp;  voice mail plan</a:t>
+            </a:r>
+          </a:p>
+          <a:p>
+            <a:endParaRPr lang="en-US" dirty="0"/>
+          </a:p>
+          <a:p>
+            <a:r>
+              <a:rPr lang="en-US" b="1" dirty="0"/>
+              <a:t>The Numerical columns includes ; </a:t>
+            </a:r>
+            <a:r>
+              <a:rPr lang="en-US" dirty="0"/>
+              <a:t> account length, area code, number </a:t>
+            </a:r>
+            <a:r>
+              <a:rPr lang="en-US" dirty="0" err="1"/>
               <a:t>vmail</a:t>
             </a:r>
             <a:r>
-              <a:rPr lang="en-US" sz="1200" dirty="0"/>
-              <a:t> messages,</a:t>
-            </a:r>
-          </a:p>
-          <a:p>
-            <a:r>
-              <a:rPr lang="en-US" sz="1200" dirty="0"/>
-              <a:t>- total day minutes</a:t>
-            </a:r>
-          </a:p>
-          <a:p>
-            <a:r>
-              <a:rPr lang="en-US" sz="1200" dirty="0"/>
-              <a:t>- total day calls,</a:t>
-            </a:r>
-          </a:p>
-          <a:p>
-            <a:r>
-              <a:rPr lang="en-US" sz="1200" dirty="0"/>
-              <a:t>- total day charge,</a:t>
-            </a:r>
-          </a:p>
-          <a:p>
-            <a:r>
-              <a:rPr lang="en-US" sz="1200" dirty="0"/>
-              <a:t>- total eve minutes,</a:t>
-            </a:r>
-          </a:p>
-          <a:p>
-            <a:r>
-              <a:rPr lang="en-US" sz="1200" dirty="0"/>
-              <a:t>- total eve calls,</a:t>
-            </a:r>
-          </a:p>
-          <a:p>
-            <a:r>
-              <a:rPr lang="en-US" sz="1200" dirty="0"/>
-              <a:t>- total eve charge</a:t>
-            </a:r>
-          </a:p>
-          <a:p>
-            <a:r>
-              <a:rPr lang="en-US" sz="1200" dirty="0"/>
-              <a:t>- total night minutes</a:t>
-            </a:r>
-          </a:p>
-          <a:p>
-            <a:r>
-              <a:rPr lang="en-US" sz="1200" dirty="0"/>
-              <a:t>- total night calls,</a:t>
-            </a:r>
-          </a:p>
-          <a:p>
-            <a:r>
-              <a:rPr lang="en-US" sz="1200" dirty="0"/>
-              <a:t>- total night charge, </a:t>
-            </a:r>
-          </a:p>
-          <a:p>
-            <a:r>
-              <a:rPr lang="en-US" sz="1200" dirty="0"/>
-              <a:t>- total </a:t>
-            </a:r>
-            <a:r>
-              <a:rPr lang="en-US" sz="1200" dirty="0" err="1"/>
+              <a:rPr lang="en-US" dirty="0"/>
+              <a:t> messages, total day minutes, total day calls,  total day charge, total eve minutes, total eve calls, total eve charge, total night minutes, total night calls, total night charge, total </a:t>
+            </a:r>
+            <a:r>
+              <a:rPr lang="en-US" dirty="0" err="1"/>
               <a:t>intl</a:t>
             </a:r>
             <a:r>
-              <a:rPr lang="en-US" sz="1200" dirty="0"/>
-              <a:t> minutes,</a:t>
-            </a:r>
-          </a:p>
-          <a:p>
-            <a:r>
-              <a:rPr lang="en-US" sz="1200" dirty="0"/>
-              <a:t>- total </a:t>
-            </a:r>
-            <a:r>
-              <a:rPr lang="en-US" sz="1200" dirty="0" err="1"/>
+              <a:rPr lang="en-US" dirty="0"/>
+              <a:t> minutes, total </a:t>
+            </a:r>
+            <a:r>
+              <a:rPr lang="en-US" dirty="0" err="1"/>
               <a:t>intl</a:t>
             </a:r>
             <a:r>
-              <a:rPr lang="en-US" sz="1200" dirty="0"/>
-              <a:t> calls, </a:t>
-            </a:r>
-          </a:p>
-          <a:p>
-            <a:r>
-              <a:rPr lang="en-US" sz="1200" dirty="0"/>
-              <a:t>- total </a:t>
-            </a:r>
-            <a:r>
-              <a:rPr lang="en-US" sz="1200" dirty="0" err="1"/>
+              <a:rPr lang="en-US" dirty="0"/>
+              <a:t> calls, total </a:t>
+            </a:r>
+            <a:r>
+              <a:rPr lang="en-US" dirty="0" err="1"/>
               <a:t>intl</a:t>
             </a:r>
             <a:r>
-              <a:rPr lang="en-US" sz="1200" dirty="0"/>
-              <a:t> charge</a:t>
-            </a:r>
-          </a:p>
-          <a:p>
-            <a:r>
-              <a:rPr lang="en-US" sz="1200" dirty="0"/>
-              <a:t>- customer service calls</a:t>
-            </a:r>
-          </a:p>
-          <a:p>
-            <a:endParaRPr lang="en-US" sz="1200" dirty="0"/>
-          </a:p>
-          <a:p>
-            <a:r>
-              <a:rPr lang="en-US" sz="1200" dirty="0"/>
-              <a:t>Boolean Target: churn.</a:t>
-            </a:r>
-          </a:p>
-          <a:p>
-            <a:endParaRPr lang="en-US" sz="1200" dirty="0"/>
-          </a:p>
-          <a:p>
-            <a:r>
-              <a:rPr lang="en-US" sz="1200" dirty="0"/>
-              <a:t>Given we are solving classification problem, our target variable is churn-  </a:t>
-            </a:r>
-            <a:r>
-              <a:rPr lang="en-US" sz="1200" dirty="0" err="1"/>
-              <a:t>sincce</a:t>
-            </a:r>
-            <a:r>
-              <a:rPr lang="en-US" sz="1200" dirty="0"/>
-              <a:t> it is a binary variable.</a:t>
-            </a:r>
-            <a:endParaRPr lang="en-KE" sz="1200" dirty="0"/>
+              <a:rPr lang="en-US" dirty="0"/>
+              <a:t> charge, customer service calls</a:t>
+            </a:r>
+          </a:p>
+          <a:p>
+            <a:r>
+              <a:rPr lang="en-US" b="1" dirty="0"/>
+              <a:t>Boolean Target</a:t>
+            </a:r>
+            <a:r>
+              <a:rPr lang="en-US" dirty="0"/>
+              <a:t>: churn. Given we are solving classification problem, our target variable is churn-  since it is a binary variable.</a:t>
+            </a:r>
+            <a:endParaRPr lang="en-KE" dirty="0"/>
           </a:p>
         </p:txBody>
       </p:sp>
@@ -4990,7 +4958,13 @@
   <p:cSld>
     <p:spTree>
       <p:nvGrpSpPr>
-        <p:cNvPr id="1" name=""/>
+        <p:cNvPr id="1" name="">
+          <a:extLst>
+            <a:ext uri="{FF2B5EF4-FFF2-40B4-BE49-F238E27FC236}">
+              <a16:creationId xmlns:a16="http://schemas.microsoft.com/office/drawing/2014/main" id="{0B1B9A59-754B-C0BD-FCB5-632132453FCB}"/>
+            </a:ext>
+          </a:extLst>
+        </p:cNvPr>
         <p:cNvGrpSpPr/>
         <p:nvPr/>
       </p:nvGrpSpPr>
@@ -5004,10 +4978,10 @@
       </p:grpSpPr>
       <p:sp>
         <p:nvSpPr>
-          <p:cNvPr id="2" name="Title 1">
-            <a:extLst>
-              <a:ext uri="{FF2B5EF4-FFF2-40B4-BE49-F238E27FC236}">
-                <a16:creationId xmlns:a16="http://schemas.microsoft.com/office/drawing/2014/main" id="{5314AB9B-BE06-0F80-661C-6F458653FCA4}"/>
+          <p:cNvPr id="4" name="Title 3">
+            <a:extLst>
+              <a:ext uri="{FF2B5EF4-FFF2-40B4-BE49-F238E27FC236}">
+                <a16:creationId xmlns:a16="http://schemas.microsoft.com/office/drawing/2014/main" id="{F4874019-7F76-6229-924D-A4C654B022F0}"/>
               </a:ext>
             </a:extLst>
           </p:cNvPr>
@@ -5018,21 +4992,32 @@
             <p:ph type="title"/>
           </p:nvPr>
         </p:nvSpPr>
-        <p:spPr/>
-        <p:txBody>
-          <a:bodyPr/>
-          <a:lstStyle/>
-          <a:p>
+        <p:spPr>
+          <a:xfrm>
+            <a:off x="1217526" y="223408"/>
+            <a:ext cx="8886884" cy="953669"/>
+          </a:xfrm>
+        </p:spPr>
+        <p:txBody>
+          <a:bodyPr>
+            <a:normAutofit/>
+          </a:bodyPr>
+          <a:lstStyle/>
+          <a:p>
+            <a:r>
+              <a:rPr lang="en-US" dirty="0"/>
+              <a:t>Data Cleaning: </a:t>
+            </a:r>
             <a:endParaRPr lang="en-KE" dirty="0"/>
           </a:p>
         </p:txBody>
       </p:sp>
       <p:sp>
         <p:nvSpPr>
-          <p:cNvPr id="3" name="Content Placeholder 2">
-            <a:extLst>
-              <a:ext uri="{FF2B5EF4-FFF2-40B4-BE49-F238E27FC236}">
-                <a16:creationId xmlns:a16="http://schemas.microsoft.com/office/drawing/2014/main" id="{FAFC83BE-1D79-9154-B964-C18CC62B14E4}"/>
+          <p:cNvPr id="5" name="Content Placeholder 4">
+            <a:extLst>
+              <a:ext uri="{FF2B5EF4-FFF2-40B4-BE49-F238E27FC236}">
+                <a16:creationId xmlns:a16="http://schemas.microsoft.com/office/drawing/2014/main" id="{E8473AE4-C804-F39B-D6E1-3A3965229F2E}"/>
               </a:ext>
             </a:extLst>
           </p:cNvPr>
@@ -5043,19 +5028,346 @@
             <p:ph idx="1"/>
           </p:nvPr>
         </p:nvSpPr>
-        <p:spPr/>
-        <p:txBody>
-          <a:bodyPr/>
-          <a:lstStyle/>
-          <a:p>
-            <a:endParaRPr lang="en-KE"/>
+        <p:spPr>
+          <a:xfrm>
+            <a:off x="416705" y="1457011"/>
+            <a:ext cx="11329818" cy="5177581"/>
+          </a:xfrm>
+        </p:spPr>
+        <p:txBody>
+          <a:bodyPr>
+            <a:noAutofit/>
+          </a:bodyPr>
+          <a:lstStyle/>
+          <a:p>
+            <a:r>
+              <a:rPr lang="en-US" b="1" dirty="0"/>
+              <a:t>No Missing Values and No Duplicate Values</a:t>
+            </a:r>
+            <a:r>
+              <a:rPr lang="en-US" dirty="0"/>
+              <a:t>: All columns have complete data.</a:t>
+            </a:r>
+          </a:p>
+          <a:p>
+            <a:endParaRPr lang="en-US" dirty="0"/>
+          </a:p>
+          <a:p>
+            <a:r>
+              <a:rPr lang="en-US" dirty="0"/>
+              <a:t>The dataset has four data types (integer, float, object and </a:t>
+            </a:r>
+            <a:r>
+              <a:rPr lang="en-US" dirty="0" err="1"/>
+              <a:t>boolean</a:t>
+            </a:r>
+            <a:r>
+              <a:rPr lang="en-US" dirty="0"/>
+              <a:t>)</a:t>
+            </a:r>
+          </a:p>
+          <a:p>
+            <a:endParaRPr lang="en-US" dirty="0"/>
+          </a:p>
+          <a:p>
+            <a:r>
+              <a:rPr lang="en-US" b="1" dirty="0"/>
+              <a:t>Boolean Target</a:t>
+            </a:r>
+            <a:r>
+              <a:rPr lang="en-US" dirty="0"/>
+              <a:t>: churn. Given we are solving classification problem, our target variable is churn-  since it is a binary variable.</a:t>
+            </a:r>
+            <a:endParaRPr lang="en-KE" dirty="0"/>
+          </a:p>
+          <a:p>
+            <a:pPr marL="0" indent="0">
+              <a:buNone/>
+            </a:pPr>
+            <a:endParaRPr lang="en-US" dirty="0"/>
+          </a:p>
+          <a:p>
+            <a:endParaRPr lang="en-KE" dirty="0"/>
           </a:p>
         </p:txBody>
       </p:sp>
     </p:spTree>
     <p:extLst>
       <p:ext uri="{BB962C8B-B14F-4D97-AF65-F5344CB8AC3E}">
-        <p14:creationId xmlns:p14="http://schemas.microsoft.com/office/powerpoint/2010/main" val="2167070895"/>
+        <p14:creationId xmlns:p14="http://schemas.microsoft.com/office/powerpoint/2010/main" val="679891736"/>
+      </p:ext>
+    </p:extLst>
+  </p:cSld>
+  <p:clrMapOvr>
+    <a:masterClrMapping/>
+  </p:clrMapOvr>
+</p:sld>
+</file>
+
+<file path=ppt/slides/slide6.xml><?xml version="1.0" encoding="utf-8"?>
+<p:sld xmlns:a="http://schemas.openxmlformats.org/drawingml/2006/main" xmlns:r="http://schemas.openxmlformats.org/officeDocument/2006/relationships" xmlns:p="http://schemas.openxmlformats.org/presentationml/2006/main">
+  <p:cSld>
+    <p:spTree>
+      <p:nvGrpSpPr>
+        <p:cNvPr id="1" name="">
+          <a:extLst>
+            <a:ext uri="{FF2B5EF4-FFF2-40B4-BE49-F238E27FC236}">
+              <a16:creationId xmlns:a16="http://schemas.microsoft.com/office/drawing/2014/main" id="{F00986AE-6E6B-B786-7FEE-E5D8BE897362}"/>
+            </a:ext>
+          </a:extLst>
+        </p:cNvPr>
+        <p:cNvGrpSpPr/>
+        <p:nvPr/>
+      </p:nvGrpSpPr>
+      <p:grpSpPr>
+        <a:xfrm>
+          <a:off x="0" y="0"/>
+          <a:ext cx="0" cy="0"/>
+          <a:chOff x="0" y="0"/>
+          <a:chExt cx="0" cy="0"/>
+        </a:xfrm>
+      </p:grpSpPr>
+      <p:sp>
+        <p:nvSpPr>
+          <p:cNvPr id="4" name="Title 3">
+            <a:extLst>
+              <a:ext uri="{FF2B5EF4-FFF2-40B4-BE49-F238E27FC236}">
+                <a16:creationId xmlns:a16="http://schemas.microsoft.com/office/drawing/2014/main" id="{C7E5518E-0BBE-71C3-2268-032A9157CCDB}"/>
+              </a:ext>
+            </a:extLst>
+          </p:cNvPr>
+          <p:cNvSpPr>
+            <a:spLocks noGrp="1"/>
+          </p:cNvSpPr>
+          <p:nvPr>
+            <p:ph type="title"/>
+          </p:nvPr>
+        </p:nvSpPr>
+        <p:spPr>
+          <a:xfrm>
+            <a:off x="1217526" y="223408"/>
+            <a:ext cx="8886884" cy="953669"/>
+          </a:xfrm>
+        </p:spPr>
+        <p:txBody>
+          <a:bodyPr>
+            <a:normAutofit/>
+          </a:bodyPr>
+          <a:lstStyle/>
+          <a:p>
+            <a:r>
+              <a:rPr lang="en-US" dirty="0"/>
+              <a:t>Modelling: </a:t>
+            </a:r>
+            <a:endParaRPr lang="en-KE" dirty="0"/>
+          </a:p>
+        </p:txBody>
+      </p:sp>
+      <p:sp>
+        <p:nvSpPr>
+          <p:cNvPr id="5" name="Content Placeholder 4">
+            <a:extLst>
+              <a:ext uri="{FF2B5EF4-FFF2-40B4-BE49-F238E27FC236}">
+                <a16:creationId xmlns:a16="http://schemas.microsoft.com/office/drawing/2014/main" id="{53E527FA-664B-787A-197A-211D120CAAD8}"/>
+              </a:ext>
+            </a:extLst>
+          </p:cNvPr>
+          <p:cNvSpPr>
+            <a:spLocks noGrp="1"/>
+          </p:cNvSpPr>
+          <p:nvPr>
+            <p:ph idx="1"/>
+          </p:nvPr>
+        </p:nvSpPr>
+        <p:spPr>
+          <a:xfrm>
+            <a:off x="416705" y="1457011"/>
+            <a:ext cx="11329818" cy="5177581"/>
+          </a:xfrm>
+        </p:spPr>
+        <p:txBody>
+          <a:bodyPr>
+            <a:noAutofit/>
+          </a:bodyPr>
+          <a:lstStyle/>
+          <a:p>
+            <a:r>
+              <a:rPr lang="en-US" dirty="0"/>
+              <a:t>Given the project was to solve a classification problem, we used the following model to derive a predictive model:</a:t>
+            </a:r>
+          </a:p>
+          <a:p>
+            <a:pPr marL="342900" indent="-342900">
+              <a:buFont typeface="+mj-lt"/>
+              <a:buAutoNum type="arabicPeriod"/>
+            </a:pPr>
+            <a:r>
+              <a:rPr lang="en-US" dirty="0"/>
+              <a:t>Logistic regression – This was used to build a Baseline model and Tuned Best model</a:t>
+            </a:r>
+          </a:p>
+          <a:p>
+            <a:pPr marL="342900" indent="-342900">
+              <a:buFont typeface="+mj-lt"/>
+              <a:buAutoNum type="arabicPeriod"/>
+            </a:pPr>
+            <a:endParaRPr lang="en-US" dirty="0"/>
+          </a:p>
+          <a:p>
+            <a:pPr marL="342900" indent="-342900">
+              <a:buFont typeface="+mj-lt"/>
+              <a:buAutoNum type="arabicPeriod"/>
+            </a:pPr>
+            <a:r>
+              <a:rPr lang="en-US" dirty="0"/>
+              <a:t>Decision Tree- </a:t>
+            </a:r>
+          </a:p>
+          <a:p>
+            <a:pPr marL="342900" indent="-342900">
+              <a:buFont typeface="+mj-lt"/>
+              <a:buAutoNum type="arabicPeriod"/>
+            </a:pPr>
+            <a:endParaRPr lang="en-US" dirty="0"/>
+          </a:p>
+          <a:p>
+            <a:pPr marL="342900" indent="-342900">
+              <a:buFont typeface="+mj-lt"/>
+              <a:buAutoNum type="arabicPeriod"/>
+            </a:pPr>
+            <a:r>
+              <a:rPr lang="en-US" dirty="0"/>
+              <a:t>Random Forest Model</a:t>
+            </a:r>
+          </a:p>
+          <a:p>
+            <a:pPr marL="342900" indent="-342900">
+              <a:buFont typeface="+mj-lt"/>
+              <a:buAutoNum type="arabicPeriod"/>
+            </a:pPr>
+            <a:endParaRPr lang="en-US" dirty="0"/>
+          </a:p>
+          <a:p>
+            <a:pPr marL="342900" indent="-342900">
+              <a:buFont typeface="+mj-lt"/>
+              <a:buAutoNum type="arabicPeriod"/>
+            </a:pPr>
+            <a:r>
+              <a:rPr lang="en-US" dirty="0"/>
+              <a:t>Gradient Boosting Model</a:t>
+            </a:r>
+            <a:endParaRPr lang="en-KE" dirty="0"/>
+          </a:p>
+        </p:txBody>
+      </p:sp>
+    </p:spTree>
+    <p:extLst>
+      <p:ext uri="{BB962C8B-B14F-4D97-AF65-F5344CB8AC3E}">
+        <p14:creationId xmlns:p14="http://schemas.microsoft.com/office/powerpoint/2010/main" val="955604182"/>
+      </p:ext>
+    </p:extLst>
+  </p:cSld>
+  <p:clrMapOvr>
+    <a:masterClrMapping/>
+  </p:clrMapOvr>
+</p:sld>
+</file>
+
+<file path=ppt/slides/slide7.xml><?xml version="1.0" encoding="utf-8"?>
+<p:sld xmlns:a="http://schemas.openxmlformats.org/drawingml/2006/main" xmlns:r="http://schemas.openxmlformats.org/officeDocument/2006/relationships" xmlns:p="http://schemas.openxmlformats.org/presentationml/2006/main">
+  <p:cSld>
+    <p:spTree>
+      <p:nvGrpSpPr>
+        <p:cNvPr id="1" name="">
+          <a:extLst>
+            <a:ext uri="{FF2B5EF4-FFF2-40B4-BE49-F238E27FC236}">
+              <a16:creationId xmlns:a16="http://schemas.microsoft.com/office/drawing/2014/main" id="{A5E72F7B-DDE3-60D8-3330-F7796B51E4D0}"/>
+            </a:ext>
+          </a:extLst>
+        </p:cNvPr>
+        <p:cNvGrpSpPr/>
+        <p:nvPr/>
+      </p:nvGrpSpPr>
+      <p:grpSpPr>
+        <a:xfrm>
+          <a:off x="0" y="0"/>
+          <a:ext cx="0" cy="0"/>
+          <a:chOff x="0" y="0"/>
+          <a:chExt cx="0" cy="0"/>
+        </a:xfrm>
+      </p:grpSpPr>
+      <p:sp>
+        <p:nvSpPr>
+          <p:cNvPr id="4" name="Title 3">
+            <a:extLst>
+              <a:ext uri="{FF2B5EF4-FFF2-40B4-BE49-F238E27FC236}">
+                <a16:creationId xmlns:a16="http://schemas.microsoft.com/office/drawing/2014/main" id="{86D22DE6-E225-2EC6-A5BE-076E9E245864}"/>
+              </a:ext>
+            </a:extLst>
+          </p:cNvPr>
+          <p:cNvSpPr>
+            <a:spLocks noGrp="1"/>
+          </p:cNvSpPr>
+          <p:nvPr>
+            <p:ph type="title"/>
+          </p:nvPr>
+        </p:nvSpPr>
+        <p:spPr>
+          <a:xfrm>
+            <a:off x="1217526" y="223408"/>
+            <a:ext cx="8886884" cy="953669"/>
+          </a:xfrm>
+        </p:spPr>
+        <p:txBody>
+          <a:bodyPr>
+            <a:normAutofit/>
+          </a:bodyPr>
+          <a:lstStyle/>
+          <a:p>
+            <a:r>
+              <a:rPr lang="en-US" dirty="0"/>
+              <a:t>Model Evaluation</a:t>
+            </a:r>
+            <a:endParaRPr lang="en-KE" dirty="0"/>
+          </a:p>
+        </p:txBody>
+      </p:sp>
+      <p:sp>
+        <p:nvSpPr>
+          <p:cNvPr id="5" name="Content Placeholder 4">
+            <a:extLst>
+              <a:ext uri="{FF2B5EF4-FFF2-40B4-BE49-F238E27FC236}">
+                <a16:creationId xmlns:a16="http://schemas.microsoft.com/office/drawing/2014/main" id="{05E1F9A5-F49E-F8DA-9954-30A2BF7D4041}"/>
+              </a:ext>
+            </a:extLst>
+          </p:cNvPr>
+          <p:cNvSpPr>
+            <a:spLocks noGrp="1"/>
+          </p:cNvSpPr>
+          <p:nvPr>
+            <p:ph idx="1"/>
+          </p:nvPr>
+        </p:nvSpPr>
+        <p:spPr>
+          <a:xfrm>
+            <a:off x="416705" y="1457011"/>
+            <a:ext cx="11329818" cy="5177581"/>
+          </a:xfrm>
+        </p:spPr>
+        <p:txBody>
+          <a:bodyPr>
+            <a:noAutofit/>
+          </a:bodyPr>
+          <a:lstStyle/>
+          <a:p>
+            <a:endParaRPr lang="en-KE" dirty="0"/>
+          </a:p>
+        </p:txBody>
+      </p:sp>
+    </p:spTree>
+    <p:extLst>
+      <p:ext uri="{BB962C8B-B14F-4D97-AF65-F5344CB8AC3E}">
+        <p14:creationId xmlns:p14="http://schemas.microsoft.com/office/powerpoint/2010/main" val="1818200951"/>
       </p:ext>
     </p:extLst>
   </p:cSld>

</xml_diff>

<commit_message>
Changes to readme file for images
</commit_message>
<xml_diff>
--- a/Customer Churn rate Prediction Model for SyriaTel Company.pptx
+++ b/Customer Churn rate Prediction Model for SyriaTel Company.pptx
@@ -138,7 +138,7 @@
   <pc:docChgLst>
     <pc:chgData name="DANIEL KITHINJI" userId="b79b49471f314f51" providerId="LiveId" clId="{D13FFEC6-0668-43AA-8E2D-B7ECDAB2680A}"/>
     <pc:docChg chg="undo redo custSel addSld delSld modSld sldOrd">
-      <pc:chgData name="DANIEL KITHINJI" userId="b79b49471f314f51" providerId="LiveId" clId="{D13FFEC6-0668-43AA-8E2D-B7ECDAB2680A}" dt="2024-12-23T18:19:31.475" v="2554" actId="255"/>
+      <pc:chgData name="DANIEL KITHINJI" userId="b79b49471f314f51" providerId="LiveId" clId="{D13FFEC6-0668-43AA-8E2D-B7ECDAB2680A}" dt="2024-12-23T18:40:34.834" v="2599" actId="6549"/>
       <pc:docMkLst>
         <pc:docMk/>
       </pc:docMkLst>
@@ -441,7 +441,7 @@
         </pc:picChg>
       </pc:sldChg>
       <pc:sldChg chg="addSp delSp modSp add mod setBg">
-        <pc:chgData name="DANIEL KITHINJI" userId="b79b49471f314f51" providerId="LiveId" clId="{D13FFEC6-0668-43AA-8E2D-B7ECDAB2680A}" dt="2024-12-23T18:18:43.393" v="2513" actId="20577"/>
+        <pc:chgData name="DANIEL KITHINJI" userId="b79b49471f314f51" providerId="LiveId" clId="{D13FFEC6-0668-43AA-8E2D-B7ECDAB2680A}" dt="2024-12-23T18:40:34.834" v="2599" actId="6549"/>
         <pc:sldMkLst>
           <pc:docMk/>
           <pc:sldMk cId="955604182" sldId="262"/>
@@ -455,7 +455,7 @@
           </ac:spMkLst>
         </pc:spChg>
         <pc:spChg chg="mod">
-          <ac:chgData name="DANIEL KITHINJI" userId="b79b49471f314f51" providerId="LiveId" clId="{D13FFEC6-0668-43AA-8E2D-B7ECDAB2680A}" dt="2024-12-23T18:18:43.393" v="2513" actId="20577"/>
+          <ac:chgData name="DANIEL KITHINJI" userId="b79b49471f314f51" providerId="LiveId" clId="{D13FFEC6-0668-43AA-8E2D-B7ECDAB2680A}" dt="2024-12-23T18:40:34.834" v="2599" actId="6549"/>
           <ac:spMkLst>
             <pc:docMk/>
             <pc:sldMk cId="955604182" sldId="262"/>
@@ -583,7 +583,7 @@
         </pc:picChg>
       </pc:sldChg>
       <pc:sldChg chg="addSp delSp modSp add mod setBg">
-        <pc:chgData name="DANIEL KITHINJI" userId="b79b49471f314f51" providerId="LiveId" clId="{D13FFEC6-0668-43AA-8E2D-B7ECDAB2680A}" dt="2024-12-23T18:04:06.568" v="2051" actId="2711"/>
+        <pc:chgData name="DANIEL KITHINJI" userId="b79b49471f314f51" providerId="LiveId" clId="{D13FFEC6-0668-43AA-8E2D-B7ECDAB2680A}" dt="2024-12-23T18:36:02.958" v="2556" actId="1076"/>
         <pc:sldMkLst>
           <pc:docMk/>
           <pc:sldMk cId="4079615756" sldId="264"/>
@@ -645,7 +645,7 @@
           </ac:picMkLst>
         </pc:picChg>
         <pc:picChg chg="add mod">
-          <ac:chgData name="DANIEL KITHINJI" userId="b79b49471f314f51" providerId="LiveId" clId="{D13FFEC6-0668-43AA-8E2D-B7ECDAB2680A}" dt="2024-12-23T17:20:17.075" v="913" actId="1076"/>
+          <ac:chgData name="DANIEL KITHINJI" userId="b79b49471f314f51" providerId="LiveId" clId="{D13FFEC6-0668-43AA-8E2D-B7ECDAB2680A}" dt="2024-12-23T18:36:02.958" v="2556" actId="1076"/>
           <ac:picMkLst>
             <pc:docMk/>
             <pc:sldMk cId="4079615756" sldId="264"/>
@@ -9713,9 +9713,12 @@
               <a:buFont typeface="+mj-lt"/>
               <a:buAutoNum type="arabicPeriod"/>
             </a:pPr>
-            <a:endParaRPr lang="en-US" sz="2400" dirty="0">
-              <a:latin typeface="Amasis MT Pro" panose="02040504050005020304" pitchFamily="18" charset="0"/>
-            </a:endParaRPr>
+            <a:r>
+              <a:rPr lang="en-US" sz="2400" dirty="0">
+                <a:latin typeface="Amasis MT Pro" panose="02040504050005020304" pitchFamily="18" charset="0"/>
+              </a:rPr>
+              <a:t>Decision Tree Model - </a:t>
+            </a:r>
           </a:p>
           <a:p>
             <a:pPr marL="342900" indent="-342900">
@@ -9729,47 +9732,8 @@
               <a:rPr lang="en-US" sz="2400" dirty="0">
                 <a:latin typeface="Amasis MT Pro" panose="02040504050005020304" pitchFamily="18" charset="0"/>
               </a:rPr>
-              <a:t>Decision Tree Model - </a:t>
-            </a:r>
-          </a:p>
-          <a:p>
-            <a:pPr marL="342900" indent="-342900">
-              <a:lnSpc>
-                <a:spcPct val="110000"/>
-              </a:lnSpc>
-              <a:buFont typeface="+mj-lt"/>
-              <a:buAutoNum type="arabicPeriod"/>
-            </a:pPr>
-            <a:endParaRPr lang="en-US" sz="2400" dirty="0">
-              <a:latin typeface="Amasis MT Pro" panose="02040504050005020304" pitchFamily="18" charset="0"/>
-            </a:endParaRPr>
-          </a:p>
-          <a:p>
-            <a:pPr marL="342900" indent="-342900">
-              <a:lnSpc>
-                <a:spcPct val="110000"/>
-              </a:lnSpc>
-              <a:buFont typeface="+mj-lt"/>
-              <a:buAutoNum type="arabicPeriod"/>
-            </a:pPr>
-            <a:r>
-              <a:rPr lang="en-US" sz="2400" dirty="0">
-                <a:latin typeface="Amasis MT Pro" panose="02040504050005020304" pitchFamily="18" charset="0"/>
-              </a:rPr>
-              <a:t>Random Forest Model - </a:t>
-            </a:r>
-          </a:p>
-          <a:p>
-            <a:pPr marL="342900" indent="-342900">
-              <a:lnSpc>
-                <a:spcPct val="110000"/>
-              </a:lnSpc>
-              <a:buFont typeface="+mj-lt"/>
-              <a:buAutoNum type="arabicPeriod"/>
-            </a:pPr>
-            <a:endParaRPr lang="en-US" sz="2400" dirty="0">
-              <a:latin typeface="Amasis MT Pro" panose="02040504050005020304" pitchFamily="18" charset="0"/>
-            </a:endParaRPr>
+              <a:t>Random Forest Model – ( This was selected as preferred model)</a:t>
+            </a:r>
           </a:p>
           <a:p>
             <a:pPr marL="342900" indent="-342900">

</xml_diff>